<commit_message>
docker vs container, practice and experience
</commit_message>
<xml_diff>
--- a/data-center-2017-c03-05.pptx
+++ b/data-center-2017-c03-05.pptx
@@ -5,7 +5,7 @@
     <p:sldMasterId id="2147483660" r:id="rId1"/>
   </p:sldMasterIdLst>
   <p:notesMasterIdLst>
-    <p:notesMasterId r:id="rId60"/>
+    <p:notesMasterId r:id="rId61"/>
   </p:notesMasterIdLst>
   <p:sldIdLst>
     <p:sldId id="256" r:id="rId2"/>
@@ -64,8 +64,9 @@
     <p:sldId id="335" r:id="rId55"/>
     <p:sldId id="336" r:id="rId56"/>
     <p:sldId id="337" r:id="rId57"/>
-    <p:sldId id="338" r:id="rId58"/>
-    <p:sldId id="339" r:id="rId59"/>
+    <p:sldId id="346" r:id="rId58"/>
+    <p:sldId id="347" r:id="rId59"/>
+    <p:sldId id="339" r:id="rId60"/>
   </p:sldIdLst>
   <p:sldSz cx="9144000" cy="6858000" type="screen4x3"/>
   <p:notesSz cx="6858000" cy="9144000"/>
@@ -3884,7 +3885,7 @@
           <a:p>
             <a:fld id="{1F43A38B-B670-42C4-AECA-F26E06CFF6E9}" type="datetimeFigureOut">
               <a:rPr lang="zh-CN" altLang="en-US" smtClean="0"/>
-              <a:t>2017/9/21</a:t>
+              <a:t>2017/9/22</a:t>
             </a:fld>
             <a:endParaRPr lang="zh-CN" altLang="en-US"/>
           </a:p>
@@ -6642,7 +6643,7 @@
           <a:p>
             <a:fld id="{59890BD5-1E1C-4C30-A502-83AE4551E3F9}" type="datetimeFigureOut">
               <a:rPr lang="zh-CN" altLang="en-US" smtClean="0"/>
-              <a:t>2017/9/21</a:t>
+              <a:t>2017/9/22</a:t>
             </a:fld>
             <a:endParaRPr lang="zh-CN" altLang="en-US"/>
           </a:p>
@@ -6812,7 +6813,7 @@
           <a:p>
             <a:fld id="{59890BD5-1E1C-4C30-A502-83AE4551E3F9}" type="datetimeFigureOut">
               <a:rPr lang="zh-CN" altLang="en-US" smtClean="0"/>
-              <a:t>2017/9/21</a:t>
+              <a:t>2017/9/22</a:t>
             </a:fld>
             <a:endParaRPr lang="zh-CN" altLang="en-US"/>
           </a:p>
@@ -6992,7 +6993,7 @@
           <a:p>
             <a:fld id="{59890BD5-1E1C-4C30-A502-83AE4551E3F9}" type="datetimeFigureOut">
               <a:rPr lang="zh-CN" altLang="en-US" smtClean="0"/>
-              <a:t>2017/9/21</a:t>
+              <a:t>2017/9/22</a:t>
             </a:fld>
             <a:endParaRPr lang="zh-CN" altLang="en-US"/>
           </a:p>
@@ -7162,7 +7163,7 @@
           <a:p>
             <a:fld id="{59890BD5-1E1C-4C30-A502-83AE4551E3F9}" type="datetimeFigureOut">
               <a:rPr lang="zh-CN" altLang="en-US" smtClean="0"/>
-              <a:t>2017/9/21</a:t>
+              <a:t>2017/9/22</a:t>
             </a:fld>
             <a:endParaRPr lang="zh-CN" altLang="en-US"/>
           </a:p>
@@ -7406,7 +7407,7 @@
           <a:p>
             <a:fld id="{59890BD5-1E1C-4C30-A502-83AE4551E3F9}" type="datetimeFigureOut">
               <a:rPr lang="zh-CN" altLang="en-US" smtClean="0"/>
-              <a:t>2017/9/21</a:t>
+              <a:t>2017/9/22</a:t>
             </a:fld>
             <a:endParaRPr lang="zh-CN" altLang="en-US"/>
           </a:p>
@@ -7638,7 +7639,7 @@
           <a:p>
             <a:fld id="{59890BD5-1E1C-4C30-A502-83AE4551E3F9}" type="datetimeFigureOut">
               <a:rPr lang="zh-CN" altLang="en-US" smtClean="0"/>
-              <a:t>2017/9/21</a:t>
+              <a:t>2017/9/22</a:t>
             </a:fld>
             <a:endParaRPr lang="zh-CN" altLang="en-US"/>
           </a:p>
@@ -8005,7 +8006,7 @@
           <a:p>
             <a:fld id="{59890BD5-1E1C-4C30-A502-83AE4551E3F9}" type="datetimeFigureOut">
               <a:rPr lang="zh-CN" altLang="en-US" smtClean="0"/>
-              <a:t>2017/9/21</a:t>
+              <a:t>2017/9/22</a:t>
             </a:fld>
             <a:endParaRPr lang="zh-CN" altLang="en-US"/>
           </a:p>
@@ -8123,7 +8124,7 @@
           <a:p>
             <a:fld id="{59890BD5-1E1C-4C30-A502-83AE4551E3F9}" type="datetimeFigureOut">
               <a:rPr lang="zh-CN" altLang="en-US" smtClean="0"/>
-              <a:t>2017/9/21</a:t>
+              <a:t>2017/9/22</a:t>
             </a:fld>
             <a:endParaRPr lang="zh-CN" altLang="en-US"/>
           </a:p>
@@ -8218,7 +8219,7 @@
           <a:p>
             <a:fld id="{59890BD5-1E1C-4C30-A502-83AE4551E3F9}" type="datetimeFigureOut">
               <a:rPr lang="zh-CN" altLang="en-US" smtClean="0"/>
-              <a:t>2017/9/21</a:t>
+              <a:t>2017/9/22</a:t>
             </a:fld>
             <a:endParaRPr lang="zh-CN" altLang="en-US"/>
           </a:p>
@@ -8495,7 +8496,7 @@
           <a:p>
             <a:fld id="{59890BD5-1E1C-4C30-A502-83AE4551E3F9}" type="datetimeFigureOut">
               <a:rPr lang="zh-CN" altLang="en-US" smtClean="0"/>
-              <a:t>2017/9/21</a:t>
+              <a:t>2017/9/22</a:t>
             </a:fld>
             <a:endParaRPr lang="zh-CN" altLang="en-US"/>
           </a:p>
@@ -8752,7 +8753,7 @@
           <a:p>
             <a:fld id="{59890BD5-1E1C-4C30-A502-83AE4551E3F9}" type="datetimeFigureOut">
               <a:rPr lang="zh-CN" altLang="en-US" smtClean="0"/>
-              <a:t>2017/9/21</a:t>
+              <a:t>2017/9/22</a:t>
             </a:fld>
             <a:endParaRPr lang="zh-CN" altLang="en-US"/>
           </a:p>
@@ -8965,7 +8966,7 @@
           <a:p>
             <a:fld id="{59890BD5-1E1C-4C30-A502-83AE4551E3F9}" type="datetimeFigureOut">
               <a:rPr lang="zh-CN" altLang="en-US" smtClean="0"/>
-              <a:t>2017/9/21</a:t>
+              <a:t>2017/9/22</a:t>
             </a:fld>
             <a:endParaRPr lang="zh-CN" altLang="en-US"/>
           </a:p>
@@ -34079,43 +34080,16 @@
           <a:p>
             <a:r>
               <a:rPr lang="zh-CN" altLang="en-US" dirty="0"/>
-              <a:t>试一试 </a:t>
-            </a:r>
-            <a:r>
-              <a:rPr lang="en-US" altLang="zh-CN" dirty="0"/>
-              <a:t>Pandas</a:t>
-            </a:r>
+              <a:t>比较虚拟机与容器</a:t>
+            </a:r>
+            <a:endParaRPr lang="en-US" altLang="zh-CN" dirty="0"/>
+          </a:p>
+          <a:p>
             <a:r>
               <a:rPr lang="zh-CN" altLang="en-US" dirty="0"/>
-              <a:t>，与直接部署比较</a:t>
+              <a:t>让虚拟机与容器合作</a:t>
             </a:r>
             <a:endParaRPr lang="en-US" altLang="zh-CN" dirty="0"/>
-          </a:p>
-          <a:p>
-            <a:pPr lvl="1"/>
-            <a:r>
-              <a:rPr lang="en-US" altLang="zh-CN" sz="2000" dirty="0">
-                <a:hlinkClick r:id="rId4"/>
-              </a:rPr>
-              <a:t>https://store.docker.com/community/images/tailordev/pandas</a:t>
-            </a:r>
-            <a:r>
-              <a:rPr lang="en-US" altLang="zh-CN" sz="2000" dirty="0"/>
-              <a:t> </a:t>
-            </a:r>
-          </a:p>
-          <a:p>
-            <a:pPr lvl="1"/>
-            <a:r>
-              <a:rPr lang="en-US" altLang="zh-CN" sz="2000" dirty="0">
-                <a:hlinkClick r:id="rId5"/>
-              </a:rPr>
-              <a:t>https://pypi.python.org/pypi/pandas</a:t>
-            </a:r>
-            <a:r>
-              <a:rPr lang="en-US" altLang="zh-CN" sz="2000" dirty="0"/>
-              <a:t> </a:t>
-            </a:r>
           </a:p>
           <a:p>
             <a:pPr lvl="1"/>
@@ -34125,84 +34099,38 @@
       </p:sp>
       <p:pic>
         <p:nvPicPr>
-          <p:cNvPr id="8194" name="Picture 2" descr="https://www.docker.com/sites/default/files/Icon-Cloud-white.png"/>
+          <p:cNvPr id="5" name="图片 4">
+            <a:extLst>
+              <a:ext uri="{FF2B5EF4-FFF2-40B4-BE49-F238E27FC236}">
+                <a16:creationId xmlns:a16="http://schemas.microsoft.com/office/drawing/2014/main" id="{2E8EA35F-E76D-4626-8AA5-E038BD1AB957}"/>
+              </a:ext>
+            </a:extLst>
+          </p:cNvPr>
           <p:cNvPicPr>
-            <a:picLocks noChangeAspect="1" noChangeArrowheads="1"/>
+            <a:picLocks noChangeAspect="1"/>
           </p:cNvPicPr>
           <p:nvPr/>
         </p:nvPicPr>
         <p:blipFill>
-          <a:blip r:embed="rId6" cstate="print">
+          <a:blip r:embed="rId4">
             <a:extLst>
               <a:ext uri="{28A0092B-C50C-407E-A947-70E740481C1C}">
                 <a14:useLocalDpi xmlns:a14="http://schemas.microsoft.com/office/drawing/2010/main" val="0"/>
               </a:ext>
             </a:extLst>
           </a:blip>
-          <a:srcRect/>
           <a:stretch>
             <a:fillRect/>
           </a:stretch>
         </p:blipFill>
-        <p:spPr bwMode="auto">
+        <p:spPr>
           <a:xfrm>
-            <a:off x="1065840" y="3926910"/>
-            <a:ext cx="2659523" cy="2770450"/>
+            <a:off x="720000" y="4140000"/>
+            <a:ext cx="7419480" cy="2520000"/>
           </a:xfrm>
           <a:prstGeom prst="rect">
             <a:avLst/>
           </a:prstGeom>
-          <a:noFill/>
-          <a:extLst>
-            <a:ext uri="{909E8E84-426E-40DD-AFC4-6F175D3DCCD1}">
-              <a14:hiddenFill xmlns:a14="http://schemas.microsoft.com/office/drawing/2010/main">
-                <a:solidFill>
-                  <a:srgbClr val="FFFFFF"/>
-                </a:solidFill>
-              </a14:hiddenFill>
-            </a:ext>
-          </a:extLst>
-        </p:spPr>
-      </p:pic>
-      <p:pic>
-        <p:nvPicPr>
-          <p:cNvPr id="8196" name="Picture 4" descr="http://www.dataschool.io/content/images/2016/05/python_pandas.jpg"/>
-          <p:cNvPicPr>
-            <a:picLocks noChangeAspect="1" noChangeArrowheads="1"/>
-          </p:cNvPicPr>
-          <p:nvPr/>
-        </p:nvPicPr>
-        <p:blipFill>
-          <a:blip r:embed="rId7">
-            <a:extLst>
-              <a:ext uri="{28A0092B-C50C-407E-A947-70E740481C1C}">
-                <a14:useLocalDpi xmlns:a14="http://schemas.microsoft.com/office/drawing/2010/main" val="0"/>
-              </a:ext>
-            </a:extLst>
-          </a:blip>
-          <a:srcRect/>
-          <a:stretch>
-            <a:fillRect/>
-          </a:stretch>
-        </p:blipFill>
-        <p:spPr bwMode="auto">
-          <a:xfrm>
-            <a:off x="4439477" y="4233025"/>
-            <a:ext cx="3562350" cy="1866901"/>
-          </a:xfrm>
-          <a:prstGeom prst="rect">
-            <a:avLst/>
-          </a:prstGeom>
-          <a:noFill/>
-          <a:extLst>
-            <a:ext uri="{909E8E84-426E-40DD-AFC4-6F175D3DCCD1}">
-              <a14:hiddenFill xmlns:a14="http://schemas.microsoft.com/office/drawing/2010/main">
-                <a:solidFill>
-                  <a:srgbClr val="FFFFFF"/>
-                </a:solidFill>
-              </a14:hiddenFill>
-            </a:ext>
-          </a:extLst>
         </p:spPr>
       </p:pic>
     </p:spTree>
@@ -34237,7 +34165,13 @@
       </p:grpSpPr>
       <p:sp>
         <p:nvSpPr>
-          <p:cNvPr id="2" name="标题 1"/>
+          <p:cNvPr id="2" name="标题 1">
+            <a:extLst>
+              <a:ext uri="{FF2B5EF4-FFF2-40B4-BE49-F238E27FC236}">
+                <a16:creationId xmlns:a16="http://schemas.microsoft.com/office/drawing/2014/main" id="{49417715-838B-4F2E-A5D9-B5FC9024524B}"/>
+              </a:ext>
+            </a:extLst>
+          </p:cNvPr>
           <p:cNvSpPr>
             <a:spLocks noGrp="1"/>
           </p:cNvSpPr>
@@ -34257,286 +34191,84 @@
           </a:p>
         </p:txBody>
       </p:sp>
-      <p:sp>
-        <p:nvSpPr>
-          <p:cNvPr id="3" name="内容占位符 2"/>
-          <p:cNvSpPr>
-            <a:spLocks noGrp="1"/>
-          </p:cNvSpPr>
+      <p:pic>
+        <p:nvPicPr>
+          <p:cNvPr id="5" name="内容占位符 4">
+            <a:extLst>
+              <a:ext uri="{FF2B5EF4-FFF2-40B4-BE49-F238E27FC236}">
+                <a16:creationId xmlns:a16="http://schemas.microsoft.com/office/drawing/2014/main" id="{53341E3D-9017-411C-B8CD-53378286E879}"/>
+              </a:ext>
+            </a:extLst>
+          </p:cNvPr>
+          <p:cNvPicPr>
+            <a:picLocks noGrp="1" noChangeAspect="1"/>
+          </p:cNvPicPr>
           <p:nvPr>
             <p:ph idx="1"/>
           </p:nvPr>
+        </p:nvPicPr>
+        <p:blipFill>
+          <a:blip r:embed="rId2">
+            <a:extLst>
+              <a:ext uri="{28A0092B-C50C-407E-A947-70E740481C1C}">
+                <a14:useLocalDpi xmlns:a14="http://schemas.microsoft.com/office/drawing/2010/main" val="0"/>
+              </a:ext>
+            </a:extLst>
+          </a:blip>
+          <a:stretch>
+            <a:fillRect/>
+          </a:stretch>
+        </p:blipFill>
+        <p:spPr>
+          <a:xfrm>
+            <a:off x="1773112" y="1825625"/>
+            <a:ext cx="5597776" cy="4351338"/>
+          </a:xfrm>
+        </p:spPr>
+      </p:pic>
+      <p:sp>
+        <p:nvSpPr>
+          <p:cNvPr id="6" name="矩形 5">
+            <a:extLst>
+              <a:ext uri="{FF2B5EF4-FFF2-40B4-BE49-F238E27FC236}">
+                <a16:creationId xmlns:a16="http://schemas.microsoft.com/office/drawing/2014/main" id="{5A036668-BB1F-4E7D-848C-2FB41760BD51}"/>
+              </a:ext>
+            </a:extLst>
+          </p:cNvPr>
+          <p:cNvSpPr/>
+          <p:nvPr/>
         </p:nvSpPr>
-        <p:spPr/>
+        <p:spPr>
+          <a:xfrm>
+            <a:off x="1080000" y="6488389"/>
+            <a:ext cx="7920000" cy="360000"/>
+          </a:xfrm>
+          <a:prstGeom prst="rect">
+            <a:avLst/>
+          </a:prstGeom>
+        </p:spPr>
         <p:txBody>
           <a:bodyPr>
-            <a:normAutofit fontScale="55000" lnSpcReduction="20000"/>
+            <a:noAutofit/>
           </a:bodyPr>
           <a:lstStyle/>
           <a:p>
-            <a:pPr>
-              <a:lnSpc>
-                <a:spcPct val="130000"/>
-              </a:lnSpc>
-              <a:spcBef>
-                <a:spcPts val="0"/>
-              </a:spcBef>
-            </a:pPr>
-            <a:r>
-              <a:rPr lang="en-US" altLang="zh-CN" dirty="0"/>
-              <a:t>Pandas Dependencies</a:t>
-            </a:r>
-          </a:p>
-          <a:p>
-            <a:pPr lvl="1">
-              <a:lnSpc>
-                <a:spcPct val="130000"/>
-              </a:lnSpc>
-              <a:spcBef>
-                <a:spcPts val="0"/>
-              </a:spcBef>
-            </a:pPr>
-            <a:r>
-              <a:rPr lang="en-US" altLang="zh-CN" dirty="0" err="1"/>
-              <a:t>setuptools</a:t>
-            </a:r>
-            <a:endParaRPr lang="en-US" altLang="zh-CN" dirty="0"/>
-          </a:p>
-          <a:p>
-            <a:pPr lvl="1">
-              <a:lnSpc>
-                <a:spcPct val="130000"/>
-              </a:lnSpc>
-              <a:spcBef>
-                <a:spcPts val="0"/>
-              </a:spcBef>
-            </a:pPr>
-            <a:r>
-              <a:rPr lang="en-US" altLang="zh-CN" dirty="0" err="1"/>
-              <a:t>NumPy</a:t>
-            </a:r>
-            <a:r>
-              <a:rPr lang="en-US" altLang="zh-CN" dirty="0"/>
-              <a:t>: 1.7.1 or higher</a:t>
-            </a:r>
-          </a:p>
-          <a:p>
-            <a:pPr lvl="1">
-              <a:lnSpc>
-                <a:spcPct val="130000"/>
-              </a:lnSpc>
-              <a:spcBef>
-                <a:spcPts val="0"/>
-              </a:spcBef>
-            </a:pPr>
-            <a:r>
-              <a:rPr lang="en-US" altLang="zh-CN" dirty="0"/>
-              <a:t>python-</a:t>
-            </a:r>
-            <a:r>
-              <a:rPr lang="en-US" altLang="zh-CN" dirty="0" err="1"/>
-              <a:t>dateutil</a:t>
-            </a:r>
-            <a:r>
-              <a:rPr lang="en-US" altLang="zh-CN" dirty="0"/>
-              <a:t>: 1.5 or higher</a:t>
-            </a:r>
-          </a:p>
-          <a:p>
-            <a:pPr lvl="1">
-              <a:lnSpc>
-                <a:spcPct val="130000"/>
-              </a:lnSpc>
-              <a:spcBef>
-                <a:spcPts val="0"/>
-              </a:spcBef>
-            </a:pPr>
-            <a:r>
-              <a:rPr lang="en-US" altLang="zh-CN" dirty="0" err="1"/>
-              <a:t>pytz</a:t>
-            </a:r>
-            <a:r>
-              <a:rPr lang="en-US" altLang="zh-CN" dirty="0"/>
-              <a:t>: Needed for time zone support</a:t>
-            </a:r>
-          </a:p>
-          <a:p>
-            <a:pPr>
-              <a:lnSpc>
-                <a:spcPct val="130000"/>
-              </a:lnSpc>
-              <a:spcBef>
-                <a:spcPts val="0"/>
-              </a:spcBef>
-            </a:pPr>
-            <a:r>
-              <a:rPr lang="en-US" altLang="zh-CN" dirty="0"/>
-              <a:t>Recommended Dependencies (for performance)</a:t>
-            </a:r>
-          </a:p>
-          <a:p>
-            <a:pPr lvl="1">
-              <a:lnSpc>
-                <a:spcPct val="130000"/>
-              </a:lnSpc>
-              <a:spcBef>
-                <a:spcPts val="0"/>
-              </a:spcBef>
-            </a:pPr>
-            <a:r>
-              <a:rPr lang="en-US" altLang="zh-CN" dirty="0" err="1"/>
-              <a:t>numexpr</a:t>
-            </a:r>
-            <a:r>
-              <a:rPr lang="en-US" altLang="zh-CN" dirty="0"/>
-              <a:t>: for accelerating certain numerical operations. </a:t>
-            </a:r>
-            <a:r>
-              <a:rPr lang="en-US" altLang="zh-CN" dirty="0" err="1"/>
-              <a:t>numexpr</a:t>
-            </a:r>
-            <a:r>
-              <a:rPr lang="en-US" altLang="zh-CN" dirty="0"/>
-              <a:t> uses multiple cores as well as smart chunking and caching to achieve large speedups. If installed, must be Version 2.1 or higher (excluding a buggy 2.4.4). Version 2.4.6 or higher is highly recommended.</a:t>
-            </a:r>
-          </a:p>
-          <a:p>
-            <a:pPr lvl="1">
-              <a:lnSpc>
-                <a:spcPct val="130000"/>
-              </a:lnSpc>
-              <a:spcBef>
-                <a:spcPts val="0"/>
-              </a:spcBef>
-            </a:pPr>
-            <a:r>
-              <a:rPr lang="en-US" altLang="zh-CN" dirty="0"/>
-              <a:t>bottleneck: for accelerating certain types of nan evaluations. bottleneck uses specialized </a:t>
-            </a:r>
-            <a:r>
-              <a:rPr lang="en-US" altLang="zh-CN" dirty="0" err="1"/>
-              <a:t>cython</a:t>
-            </a:r>
-            <a:r>
-              <a:rPr lang="en-US" altLang="zh-CN" dirty="0"/>
-              <a:t> routines to achieve large speedups.</a:t>
-            </a:r>
-          </a:p>
-          <a:p>
-            <a:pPr>
-              <a:lnSpc>
-                <a:spcPct val="130000"/>
-              </a:lnSpc>
-              <a:spcBef>
-                <a:spcPts val="0"/>
-              </a:spcBef>
-            </a:pPr>
-            <a:r>
-              <a:rPr lang="en-US" altLang="zh-CN" dirty="0"/>
-              <a:t>Optional Dependencies</a:t>
-            </a:r>
-          </a:p>
-          <a:p>
-            <a:pPr lvl="1">
-              <a:lnSpc>
-                <a:spcPct val="130000"/>
-              </a:lnSpc>
-              <a:spcBef>
-                <a:spcPts val="0"/>
-              </a:spcBef>
-            </a:pPr>
-            <a:r>
-              <a:rPr lang="en-US" altLang="zh-CN" dirty="0" err="1"/>
-              <a:t>Cython</a:t>
-            </a:r>
-            <a:r>
-              <a:rPr lang="en-US" altLang="zh-CN" dirty="0"/>
-              <a:t>: Only necessary to build development version. Version 0.19.1 or higher.</a:t>
-            </a:r>
-          </a:p>
-          <a:p>
-            <a:pPr lvl="1">
-              <a:lnSpc>
-                <a:spcPct val="130000"/>
-              </a:lnSpc>
-              <a:spcBef>
-                <a:spcPts val="0"/>
-              </a:spcBef>
-            </a:pPr>
-            <a:r>
-              <a:rPr lang="en-US" altLang="zh-CN" dirty="0" err="1"/>
-              <a:t>SciPy</a:t>
-            </a:r>
-            <a:r>
-              <a:rPr lang="en-US" altLang="zh-CN" dirty="0"/>
-              <a:t>: miscellaneous statistical functions</a:t>
-            </a:r>
-          </a:p>
-          <a:p>
-            <a:pPr lvl="1">
-              <a:lnSpc>
-                <a:spcPct val="130000"/>
-              </a:lnSpc>
-              <a:spcBef>
-                <a:spcPts val="0"/>
-              </a:spcBef>
-            </a:pPr>
-            <a:r>
-              <a:rPr lang="en-US" altLang="zh-CN" dirty="0" err="1"/>
-              <a:t>xarray</a:t>
-            </a:r>
-            <a:r>
-              <a:rPr lang="en-US" altLang="zh-CN" dirty="0"/>
-              <a:t>: pandas like handling for &gt; 2 dims, needed for converting Panels to </a:t>
-            </a:r>
-            <a:r>
-              <a:rPr lang="en-US" altLang="zh-CN" dirty="0" err="1"/>
-              <a:t>xarray</a:t>
-            </a:r>
-            <a:r>
-              <a:rPr lang="en-US" altLang="zh-CN" dirty="0"/>
-              <a:t> objects. Version 0.7.0 or higher is recommended.</a:t>
-            </a:r>
-          </a:p>
-          <a:p>
-            <a:pPr lvl="1">
-              <a:lnSpc>
-                <a:spcPct val="130000"/>
-              </a:lnSpc>
-              <a:spcBef>
-                <a:spcPts val="0"/>
-              </a:spcBef>
-            </a:pPr>
-            <a:r>
-              <a:rPr lang="en-US" altLang="zh-CN" dirty="0" err="1"/>
-              <a:t>PyTables</a:t>
-            </a:r>
-            <a:r>
-              <a:rPr lang="en-US" altLang="zh-CN" dirty="0"/>
-              <a:t>: necessary for HDF5-based storage. Version 3.0.0 or higher required, Version 3.2.1 or higher highly recommended.</a:t>
-            </a:r>
-          </a:p>
-          <a:p>
-            <a:pPr lvl="1">
-              <a:lnSpc>
-                <a:spcPct val="130000"/>
-              </a:lnSpc>
-              <a:spcBef>
-                <a:spcPts val="0"/>
-              </a:spcBef>
-            </a:pPr>
-            <a:r>
-              <a:rPr lang="en-US" altLang="zh-CN" dirty="0"/>
-              <a:t>… …</a:t>
-            </a:r>
-            <a:endParaRPr lang="zh-CN" altLang="en-US" dirty="0"/>
+            <a:pPr algn="r"/>
+            <a:r>
+              <a:rPr lang="zh-CN" altLang="en-US" dirty="0">
+                <a:latin typeface="Times New Roman" panose="02020603050405020304" pitchFamily="18" charset="0"/>
+                <a:ea typeface="黑体" panose="02010609060101010101" pitchFamily="49" charset="-122"/>
+                <a:cs typeface="Times New Roman" panose="02020603050405020304" pitchFamily="18" charset="0"/>
+              </a:rPr>
+              <a:t>https://nickjanetakis.com/blog/comparing-virtual-machines-vs-docker-containers</a:t>
+            </a:r>
           </a:p>
         </p:txBody>
       </p:sp>
     </p:spTree>
     <p:extLst>
       <p:ext uri="{BB962C8B-B14F-4D97-AF65-F5344CB8AC3E}">
-        <p14:creationId xmlns:p14="http://schemas.microsoft.com/office/powerpoint/2010/main" val="1732679957"/>
+        <p14:creationId xmlns:p14="http://schemas.microsoft.com/office/powerpoint/2010/main" val="72368527"/>
       </p:ext>
     </p:extLst>
   </p:cSld>
@@ -34547,6 +34279,138 @@
 </file>
 
 <file path=ppt/slides/slide58.xml><?xml version="1.0" encoding="utf-8"?>
+<p:sld xmlns:a="http://schemas.openxmlformats.org/drawingml/2006/main" xmlns:r="http://schemas.openxmlformats.org/officeDocument/2006/relationships" xmlns:p="http://schemas.openxmlformats.org/presentationml/2006/main">
+  <p:cSld>
+    <p:spTree>
+      <p:nvGrpSpPr>
+        <p:cNvPr id="1" name=""/>
+        <p:cNvGrpSpPr/>
+        <p:nvPr/>
+      </p:nvGrpSpPr>
+      <p:grpSpPr>
+        <a:xfrm>
+          <a:off x="0" y="0"/>
+          <a:ext cx="0" cy="0"/>
+          <a:chOff x="0" y="0"/>
+          <a:chExt cx="0" cy="0"/>
+        </a:xfrm>
+      </p:grpSpPr>
+      <p:sp>
+        <p:nvSpPr>
+          <p:cNvPr id="2" name="标题 1">
+            <a:extLst>
+              <a:ext uri="{FF2B5EF4-FFF2-40B4-BE49-F238E27FC236}">
+                <a16:creationId xmlns:a16="http://schemas.microsoft.com/office/drawing/2014/main" id="{7DA696E8-8FE7-4173-BA76-3AD95DBABB3E}"/>
+              </a:ext>
+            </a:extLst>
+          </p:cNvPr>
+          <p:cNvSpPr>
+            <a:spLocks noGrp="1"/>
+          </p:cNvSpPr>
+          <p:nvPr>
+            <p:ph type="title"/>
+          </p:nvPr>
+        </p:nvSpPr>
+        <p:spPr/>
+        <p:txBody>
+          <a:bodyPr/>
+          <a:lstStyle/>
+          <a:p>
+            <a:r>
+              <a:rPr lang="zh-CN" altLang="en-US" dirty="0"/>
+              <a:t>实践</a:t>
+            </a:r>
+          </a:p>
+        </p:txBody>
+      </p:sp>
+      <p:pic>
+        <p:nvPicPr>
+          <p:cNvPr id="5" name="内容占位符 4">
+            <a:extLst>
+              <a:ext uri="{FF2B5EF4-FFF2-40B4-BE49-F238E27FC236}">
+                <a16:creationId xmlns:a16="http://schemas.microsoft.com/office/drawing/2014/main" id="{7414B9E4-3ABA-448C-B6F6-91634B03F0F4}"/>
+              </a:ext>
+            </a:extLst>
+          </p:cNvPr>
+          <p:cNvPicPr>
+            <a:picLocks noGrp="1" noChangeAspect="1"/>
+          </p:cNvPicPr>
+          <p:nvPr>
+            <p:ph idx="1"/>
+          </p:nvPr>
+        </p:nvPicPr>
+        <p:blipFill>
+          <a:blip r:embed="rId2">
+            <a:extLst>
+              <a:ext uri="{28A0092B-C50C-407E-A947-70E740481C1C}">
+                <a14:useLocalDpi xmlns:a14="http://schemas.microsoft.com/office/drawing/2010/main" val="0"/>
+              </a:ext>
+            </a:extLst>
+          </a:blip>
+          <a:stretch>
+            <a:fillRect/>
+          </a:stretch>
+        </p:blipFill>
+        <p:spPr>
+          <a:xfrm>
+            <a:off x="1000125" y="2291556"/>
+            <a:ext cx="7143750" cy="3419475"/>
+          </a:xfrm>
+        </p:spPr>
+      </p:pic>
+      <p:sp>
+        <p:nvSpPr>
+          <p:cNvPr id="6" name="矩形 5">
+            <a:extLst>
+              <a:ext uri="{FF2B5EF4-FFF2-40B4-BE49-F238E27FC236}">
+                <a16:creationId xmlns:a16="http://schemas.microsoft.com/office/drawing/2014/main" id="{3BB848FE-9AAB-4302-9EF3-D5C490E97A70}"/>
+              </a:ext>
+            </a:extLst>
+          </p:cNvPr>
+          <p:cNvSpPr/>
+          <p:nvPr/>
+        </p:nvSpPr>
+        <p:spPr>
+          <a:xfrm>
+            <a:off x="1080000" y="6480000"/>
+            <a:ext cx="7920000" cy="360000"/>
+          </a:xfrm>
+          <a:prstGeom prst="rect">
+            <a:avLst/>
+          </a:prstGeom>
+        </p:spPr>
+        <p:txBody>
+          <a:bodyPr>
+            <a:noAutofit/>
+          </a:bodyPr>
+          <a:lstStyle/>
+          <a:p>
+            <a:pPr algn="r"/>
+            <a:r>
+              <a:rPr lang="zh-CN" altLang="en-US" dirty="0">
+                <a:latin typeface="Times New Roman" panose="02020603050405020304" pitchFamily="18" charset="0"/>
+                <a:ea typeface="黑体" panose="02010609060101010101" pitchFamily="49" charset="-122"/>
+                <a:cs typeface="Times New Roman" panose="02020603050405020304" pitchFamily="18" charset="0"/>
+              </a:rPr>
+              <a:t>https://nickjanetakis.com/blog/comparing-virtual-machines-vs-docker-containers</a:t>
+            </a:r>
+          </a:p>
+        </p:txBody>
+      </p:sp>
+    </p:spTree>
+    <p:extLst>
+      <p:ext uri="{BB962C8B-B14F-4D97-AF65-F5344CB8AC3E}">
+        <p14:creationId xmlns:p14="http://schemas.microsoft.com/office/powerpoint/2010/main" val="104880500"/>
+      </p:ext>
+    </p:extLst>
+  </p:cSld>
+  <p:clrMapOvr>
+    <a:masterClrMapping/>
+  </p:clrMapOvr>
+</p:sld>
+</file>
+
+<file path=ppt/slides/slide59.xml><?xml version="1.0" encoding="utf-8"?>
 <p:sld xmlns:a="http://schemas.openxmlformats.org/drawingml/2006/main" xmlns:r="http://schemas.openxmlformats.org/officeDocument/2006/relationships" xmlns:p="http://schemas.openxmlformats.org/presentationml/2006/main">
   <p:cSld>
     <p:spTree>

</xml_diff>